<commit_message>
updated for filters class
</commit_message>
<xml_diff>
--- a/Classes/20191205 Filtering and Working in the Freq Domain.pptx
+++ b/Classes/20191205 Filtering and Working in the Freq Domain.pptx
@@ -154,13 +154,68 @@
 <file path=ppt/revisionInfo.xml><?xml version="1.0" encoding="utf-8"?>
 <p1510:revInfo xmlns:a="http://schemas.openxmlformats.org/drawingml/2006/main" xmlns:r="http://schemas.openxmlformats.org/officeDocument/2006/relationships" xmlns:p1510="http://schemas.microsoft.com/office/powerpoint/2015/10/main">
   <p1510:revLst>
-    <p1510:client id="{4C6BCD8E-9442-4958-A5D5-F678AD2C2BB7}" v="72" dt="2019-12-05T20:07:34.568"/>
+    <p1510:client id="{D1981CFB-FA79-41D1-A226-75275DD2F8CD}" v="11" dt="2019-12-11T19:21:55.007"/>
   </p1510:revLst>
 </p1510:revInfo>
 </file>
 
 <file path=ppt/changesInfos/changesInfo1.xml><?xml version="1.0" encoding="utf-8"?>
 <pc:chgInfo xmlns:a="http://schemas.openxmlformats.org/drawingml/2006/main" xmlns:r="http://schemas.openxmlformats.org/officeDocument/2006/relationships" xmlns:ac="http://schemas.microsoft.com/office/drawing/2013/main/command" xmlns:pc="http://schemas.microsoft.com/office/powerpoint/2013/main/command">
+  <pc:docChgLst>
+    <pc:chgData name="Ray Crampton" userId="1c230dae8f4a47c0" providerId="LiveId" clId="{D1981CFB-FA79-41D1-A226-75275DD2F8CD}"/>
+    <pc:docChg chg="custSel modSld">
+      <pc:chgData name="Ray Crampton" userId="1c230dae8f4a47c0" providerId="LiveId" clId="{D1981CFB-FA79-41D1-A226-75275DD2F8CD}" dt="2019-12-11T19:22:58.934" v="34" actId="1076"/>
+      <pc:docMkLst>
+        <pc:docMk/>
+      </pc:docMkLst>
+      <pc:sldChg chg="modSp">
+        <pc:chgData name="Ray Crampton" userId="1c230dae8f4a47c0" providerId="LiveId" clId="{D1981CFB-FA79-41D1-A226-75275DD2F8CD}" dt="2019-12-05T20:13:05.228" v="0" actId="6549"/>
+        <pc:sldMkLst>
+          <pc:docMk/>
+          <pc:sldMk cId="3331882154" sldId="435"/>
+        </pc:sldMkLst>
+        <pc:spChg chg="mod">
+          <ac:chgData name="Ray Crampton" userId="1c230dae8f4a47c0" providerId="LiveId" clId="{D1981CFB-FA79-41D1-A226-75275DD2F8CD}" dt="2019-12-05T20:13:05.228" v="0" actId="6549"/>
+          <ac:spMkLst>
+            <pc:docMk/>
+            <pc:sldMk cId="3331882154" sldId="435"/>
+            <ac:spMk id="9" creationId="{D1537D4D-D87C-4822-8555-9955D0A34EFF}"/>
+          </ac:spMkLst>
+        </pc:spChg>
+      </pc:sldChg>
+      <pc:sldChg chg="delSp modSp">
+        <pc:chgData name="Ray Crampton" userId="1c230dae8f4a47c0" providerId="LiveId" clId="{D1981CFB-FA79-41D1-A226-75275DD2F8CD}" dt="2019-12-11T19:22:58.934" v="34" actId="1076"/>
+        <pc:sldMkLst>
+          <pc:docMk/>
+          <pc:sldMk cId="3371431397" sldId="493"/>
+        </pc:sldMkLst>
+        <pc:spChg chg="mod">
+          <ac:chgData name="Ray Crampton" userId="1c230dae8f4a47c0" providerId="LiveId" clId="{D1981CFB-FA79-41D1-A226-75275DD2F8CD}" dt="2019-12-11T19:22:58.934" v="34" actId="1076"/>
+          <ac:spMkLst>
+            <pc:docMk/>
+            <pc:sldMk cId="3371431397" sldId="493"/>
+            <ac:spMk id="8" creationId="{6D449140-1471-48ED-A506-9560FE13E714}"/>
+          </ac:spMkLst>
+        </pc:spChg>
+        <pc:spChg chg="del mod">
+          <ac:chgData name="Ray Crampton" userId="1c230dae8f4a47c0" providerId="LiveId" clId="{D1981CFB-FA79-41D1-A226-75275DD2F8CD}" dt="2019-12-11T19:22:53.962" v="32" actId="478"/>
+          <ac:spMkLst>
+            <pc:docMk/>
+            <pc:sldMk cId="3371431397" sldId="493"/>
+            <ac:spMk id="9" creationId="{1D603E76-420C-4ACE-A159-20A194E8EEE7}"/>
+          </ac:spMkLst>
+        </pc:spChg>
+        <pc:spChg chg="del mod">
+          <ac:chgData name="Ray Crampton" userId="1c230dae8f4a47c0" providerId="LiveId" clId="{D1981CFB-FA79-41D1-A226-75275DD2F8CD}" dt="2019-12-11T19:22:56.356" v="33" actId="478"/>
+          <ac:spMkLst>
+            <pc:docMk/>
+            <pc:sldMk cId="3371431397" sldId="493"/>
+            <ac:spMk id="10" creationId="{81F0CAD5-9AAB-467A-9C58-5BA6C54FF6E3}"/>
+          </ac:spMkLst>
+        </pc:spChg>
+      </pc:sldChg>
+    </pc:docChg>
+  </pc:docChgLst>
   <pc:docChgLst>
     <pc:chgData name="Ray Crampton" userId="1c230dae8f4a47c0" providerId="LiveId" clId="{4C6BCD8E-9442-4958-A5D5-F678AD2C2BB7}"/>
     <pc:docChg chg="undo custSel addSld delSld modSld sldOrd">
@@ -769,7 +824,7 @@
           <a:p>
             <a:fld id="{E2962FEB-E2C2-4B56-B891-D0020443CCB3}" type="datetimeFigureOut">
               <a:rPr lang="en-US" smtClean="0"/>
-              <a:t>12/5/2019</a:t>
+              <a:t>12/11/2019</a:t>
             </a:fld>
             <a:endParaRPr lang="en-US"/>
           </a:p>
@@ -2511,7 +2566,7 @@
           <a:p>
             <a:fld id="{1576A2D9-0778-4206-AC01-1975C0DCAF44}" type="datetime1">
               <a:rPr lang="en-US" smtClean="0"/>
-              <a:t>12/5/2019</a:t>
+              <a:t>12/11/2019</a:t>
             </a:fld>
             <a:endParaRPr lang="en-US"/>
           </a:p>
@@ -2681,7 +2736,7 @@
           <a:p>
             <a:fld id="{F4E92243-817C-4045-941B-9763D6791B68}" type="datetime1">
               <a:rPr lang="en-US" smtClean="0"/>
-              <a:t>12/5/2019</a:t>
+              <a:t>12/11/2019</a:t>
             </a:fld>
             <a:endParaRPr lang="en-US"/>
           </a:p>
@@ -2861,7 +2916,7 @@
           <a:p>
             <a:fld id="{E24E3DB8-46DC-4613-9A01-1AD7895A089D}" type="datetime1">
               <a:rPr lang="en-US" smtClean="0"/>
-              <a:t>12/5/2019</a:t>
+              <a:t>12/11/2019</a:t>
             </a:fld>
             <a:endParaRPr lang="en-US"/>
           </a:p>
@@ -3098,7 +3153,7 @@
             <a:fld id="{6028F36A-7E13-415E-BC07-836CBA6572C5}" type="datetime1">
               <a:rPr lang="en-US" smtClean="0"/>
               <a:pPr/>
-              <a:t>12/5/2019</a:t>
+              <a:t>12/11/2019</a:t>
             </a:fld>
             <a:endParaRPr lang="en-US"/>
           </a:p>
@@ -3430,7 +3485,7 @@
             <a:fld id="{160F2E68-E447-4999-AB34-872BB3F84F01}" type="datetime1">
               <a:rPr lang="en-US" smtClean="0"/>
               <a:pPr/>
-              <a:t>12/5/2019</a:t>
+              <a:t>12/11/2019</a:t>
             </a:fld>
             <a:endParaRPr lang="en-US"/>
           </a:p>
@@ -3778,7 +3833,7 @@
             <a:fld id="{ECF66B24-22EB-4B17-9A5F-40619732995F}" type="datetime1">
               <a:rPr lang="en-US" smtClean="0"/>
               <a:pPr/>
-              <a:t>12/5/2019</a:t>
+              <a:t>12/11/2019</a:t>
             </a:fld>
             <a:endParaRPr lang="en-US"/>
           </a:p>
@@ -4265,7 +4320,7 @@
             <a:fld id="{DC52881C-282A-43F7-8E1A-7135F7923BA1}" type="datetime1">
               <a:rPr lang="en-US" smtClean="0"/>
               <a:pPr/>
-              <a:t>12/5/2019</a:t>
+              <a:t>12/11/2019</a:t>
             </a:fld>
             <a:endParaRPr lang="en-US"/>
           </a:p>
@@ -4400,7 +4455,7 @@
           <a:p>
             <a:fld id="{02587FAD-5C72-4DDE-A58A-5FE8EE91F92B}" type="datetime1">
               <a:rPr lang="en-US" smtClean="0"/>
-              <a:t>12/5/2019</a:t>
+              <a:t>12/11/2019</a:t>
             </a:fld>
             <a:endParaRPr lang="en-US"/>
           </a:p>
@@ -4495,7 +4550,7 @@
           <a:p>
             <a:fld id="{08CC3184-2448-41D0-A3B4-8E8F09674B4C}" type="datetime1">
               <a:rPr lang="en-US" smtClean="0"/>
-              <a:t>12/5/2019</a:t>
+              <a:t>12/11/2019</a:t>
             </a:fld>
             <a:endParaRPr lang="en-US"/>
           </a:p>
@@ -4772,7 +4827,7 @@
           <a:p>
             <a:fld id="{732E61FC-A10E-4EE2-A762-76F96F276616}" type="datetime1">
               <a:rPr lang="en-US" smtClean="0"/>
-              <a:t>12/5/2019</a:t>
+              <a:t>12/11/2019</a:t>
             </a:fld>
             <a:endParaRPr lang="en-US"/>
           </a:p>
@@ -5029,7 +5084,7 @@
           <a:p>
             <a:fld id="{50585F1A-5C4D-482B-9E9B-BB2F1F79D039}" type="datetime1">
               <a:rPr lang="en-US" smtClean="0"/>
-              <a:t>12/5/2019</a:t>
+              <a:t>12/11/2019</a:t>
             </a:fld>
             <a:endParaRPr lang="en-US"/>
           </a:p>
@@ -5242,7 +5297,7 @@
           <a:p>
             <a:fld id="{450A74C5-A641-44A9-AAD2-FA1515BFE5FB}" type="datetime1">
               <a:rPr lang="en-US" smtClean="0"/>
-              <a:t>12/5/2019</a:t>
+              <a:t>12/11/2019</a:t>
             </a:fld>
             <a:endParaRPr lang="en-US"/>
           </a:p>
@@ -10179,8 +10234,8 @@
           </a:prstGeom>
         </p:spPr>
       </p:pic>
-      <mc:AlternateContent xmlns:mc="http://schemas.openxmlformats.org/markup-compatibility/2006" xmlns:a14="http://schemas.microsoft.com/office/drawing/2010/main">
-        <mc:Choice Requires="a14">
+      <mc:AlternateContent xmlns:mc="http://schemas.openxmlformats.org/markup-compatibility/2006">
+        <mc:Choice xmlns:a14="http://schemas.microsoft.com/office/drawing/2010/main" Requires="a14">
           <p:sp>
             <p:nvSpPr>
               <p:cNvPr id="8" name="TextBox 7">
@@ -10195,8 +10250,8 @@
             </p:nvSpPr>
             <p:spPr>
               <a:xfrm>
-                <a:off x="4700597" y="1126187"/>
-                <a:ext cx="2979963" cy="898964"/>
+                <a:off x="4416362" y="1786371"/>
+                <a:ext cx="2657538" cy="898964"/>
               </a:xfrm>
               <a:prstGeom prst="rect">
                 <a:avLst/>
@@ -10273,6 +10328,27 @@
                               </a:solidFill>
                               <a:latin typeface="Cambria Math" panose="02040503050406030204" pitchFamily="18" charset="0"/>
                             </a:rPr>
+                            <m:t>2</m:t>
+                          </m:r>
+                          <m:r>
+                            <m:rPr>
+                              <m:sty m:val="p"/>
+                            </m:rPr>
+                            <a:rPr lang="el-GR" sz="2800" b="0" i="1" smtClean="0">
+                              <a:solidFill>
+                                <a:schemeClr val="bg1"/>
+                              </a:solidFill>
+                              <a:latin typeface="Cambria Math" panose="02040503050406030204" pitchFamily="18" charset="0"/>
+                            </a:rPr>
+                            <m:t>π</m:t>
+                          </m:r>
+                          <m:r>
+                            <a:rPr lang="en-US" sz="2800" b="0" i="1" smtClean="0">
+                              <a:solidFill>
+                                <a:schemeClr val="bg1"/>
+                              </a:solidFill>
+                              <a:latin typeface="Cambria Math" panose="02040503050406030204" pitchFamily="18" charset="0"/>
+                            </a:rPr>
                             <m:t>𝑅𝐶</m:t>
                           </m:r>
                         </m:den>
@@ -10289,7 +10365,7 @@
             </p:txBody>
           </p:sp>
         </mc:Choice>
-        <mc:Fallback xmlns="">
+        <mc:Fallback>
           <p:sp>
             <p:nvSpPr>
               <p:cNvPr id="8" name="TextBox 7">
@@ -10306,8 +10382,8 @@
             </p:nvSpPr>
             <p:spPr>
               <a:xfrm>
-                <a:off x="4700597" y="1126187"/>
-                <a:ext cx="2979963" cy="898964"/>
+                <a:off x="4416362" y="1786371"/>
+                <a:ext cx="2657538" cy="898964"/>
               </a:xfrm>
               <a:prstGeom prst="rect">
                 <a:avLst/>
@@ -10334,425 +10410,6 @@
           </p:sp>
         </mc:Fallback>
       </mc:AlternateContent>
-      <mc:AlternateContent xmlns:mc="http://schemas.openxmlformats.org/markup-compatibility/2006" xmlns:a14="http://schemas.microsoft.com/office/drawing/2010/main">
-        <mc:Choice Requires="a14">
-          <p:sp>
-            <p:nvSpPr>
-              <p:cNvPr id="9" name="TextBox 8">
-                <a:extLst>
-                  <a:ext uri="{FF2B5EF4-FFF2-40B4-BE49-F238E27FC236}">
-                    <a16:creationId xmlns:a16="http://schemas.microsoft.com/office/drawing/2014/main" id="{1D603E76-420C-4ACE-A159-20A194E8EEE7}"/>
-                  </a:ext>
-                </a:extLst>
-              </p:cNvPr>
-              <p:cNvSpPr txBox="1"/>
-              <p:nvPr/>
-            </p:nvSpPr>
-            <p:spPr>
-              <a:xfrm>
-                <a:off x="4114797" y="1909831"/>
-                <a:ext cx="4136108" cy="763222"/>
-              </a:xfrm>
-              <a:prstGeom prst="rect">
-                <a:avLst/>
-              </a:prstGeom>
-              <a:noFill/>
-            </p:spPr>
-            <p:txBody>
-              <a:bodyPr wrap="square" rtlCol="0">
-                <a:spAutoFit/>
-              </a:bodyPr>
-              <a:lstStyle/>
-              <a:p>
-                <a:pPr algn="ctr"/>
-                <a14:m>
-                  <m:oMathPara xmlns:m="http://schemas.openxmlformats.org/officeDocument/2006/math">
-                    <m:oMathParaPr>
-                      <m:jc m:val="centerGroup"/>
-                    </m:oMathParaPr>
-                    <m:oMath xmlns:m="http://schemas.openxmlformats.org/officeDocument/2006/math">
-                      <m:r>
-                        <a:rPr lang="en-US" sz="2800" b="0" i="1" smtClean="0">
-                          <a:solidFill>
-                            <a:schemeClr val="bg1"/>
-                          </a:solidFill>
-                          <a:latin typeface="Cambria Math" panose="02040503050406030204" pitchFamily="18" charset="0"/>
-                        </a:rPr>
-                        <m:t>𝑓</m:t>
-                      </m:r>
-                      <m:r>
-                        <a:rPr lang="en-US" sz="2800" b="0" i="1" baseline="-25000" smtClean="0">
-                          <a:solidFill>
-                            <a:schemeClr val="bg1"/>
-                          </a:solidFill>
-                          <a:latin typeface="Cambria Math" panose="02040503050406030204" pitchFamily="18" charset="0"/>
-                        </a:rPr>
-                        <m:t>𝑐</m:t>
-                      </m:r>
-                      <m:r>
-                        <a:rPr lang="en-US" sz="2800" b="0" i="1" smtClean="0">
-                          <a:solidFill>
-                            <a:schemeClr val="bg1"/>
-                          </a:solidFill>
-                          <a:latin typeface="Cambria Math" panose="02040503050406030204" pitchFamily="18" charset="0"/>
-                        </a:rPr>
-                        <m:t>=</m:t>
-                      </m:r>
-                      <m:f>
-                        <m:fPr>
-                          <m:type m:val="skw"/>
-                          <m:ctrlPr>
-                            <a:rPr lang="en-US" sz="2800" b="0" i="1" smtClean="0">
-                              <a:solidFill>
-                                <a:schemeClr val="bg1"/>
-                              </a:solidFill>
-                              <a:latin typeface="Cambria Math" panose="02040503050406030204" pitchFamily="18" charset="0"/>
-                            </a:rPr>
-                          </m:ctrlPr>
-                        </m:fPr>
-                        <m:num>
-                          <m:r>
-                            <a:rPr lang="en-US" sz="2800" b="0" i="1" smtClean="0">
-                              <a:solidFill>
-                                <a:schemeClr val="bg1"/>
-                              </a:solidFill>
-                              <a:latin typeface="Cambria Math" panose="02040503050406030204" pitchFamily="18" charset="0"/>
-                            </a:rPr>
-                            <m:t>1</m:t>
-                          </m:r>
-                        </m:num>
-                        <m:den>
-                          <m:r>
-                            <a:rPr lang="en-US" sz="2800" b="0" i="1" smtClean="0">
-                              <a:solidFill>
-                                <a:schemeClr val="bg1"/>
-                              </a:solidFill>
-                              <a:latin typeface="Cambria Math" panose="02040503050406030204" pitchFamily="18" charset="0"/>
-                            </a:rPr>
-                            <m:t>(1000</m:t>
-                          </m:r>
-                          <m:r>
-                            <a:rPr lang="en-US" sz="2800" b="0" i="1" smtClean="0">
-                              <a:solidFill>
-                                <a:schemeClr val="bg1"/>
-                              </a:solidFill>
-                              <a:latin typeface="Cambria Math" panose="02040503050406030204" pitchFamily="18" charset="0"/>
-                              <a:ea typeface="Cambria Math" panose="02040503050406030204" pitchFamily="18" charset="0"/>
-                            </a:rPr>
-                            <m:t>×1</m:t>
-                          </m:r>
-                          <m:r>
-                            <a:rPr lang="en-US" sz="2800" b="0" i="1" smtClean="0">
-                              <a:solidFill>
-                                <a:schemeClr val="bg1"/>
-                              </a:solidFill>
-                              <a:latin typeface="Cambria Math" panose="02040503050406030204" pitchFamily="18" charset="0"/>
-                              <a:ea typeface="Cambria Math" panose="02040503050406030204" pitchFamily="18" charset="0"/>
-                            </a:rPr>
-                            <m:t>𝑥</m:t>
-                          </m:r>
-                          <m:sSup>
-                            <m:sSupPr>
-                              <m:ctrlPr>
-                                <a:rPr lang="en-US" sz="2800" b="0" i="1" smtClean="0">
-                                  <a:solidFill>
-                                    <a:schemeClr val="bg1"/>
-                                  </a:solidFill>
-                                  <a:latin typeface="Cambria Math" panose="02040503050406030204" pitchFamily="18" charset="0"/>
-                                  <a:ea typeface="Cambria Math" panose="02040503050406030204" pitchFamily="18" charset="0"/>
-                                </a:rPr>
-                              </m:ctrlPr>
-                            </m:sSupPr>
-                            <m:e>
-                              <m:r>
-                                <a:rPr lang="en-US" sz="2800" b="0" i="1" smtClean="0">
-                                  <a:solidFill>
-                                    <a:schemeClr val="bg1"/>
-                                  </a:solidFill>
-                                  <a:latin typeface="Cambria Math" panose="02040503050406030204" pitchFamily="18" charset="0"/>
-                                  <a:ea typeface="Cambria Math" panose="02040503050406030204" pitchFamily="18" charset="0"/>
-                                </a:rPr>
-                                <m:t>10</m:t>
-                              </m:r>
-                            </m:e>
-                            <m:sup>
-                              <m:r>
-                                <a:rPr lang="en-US" sz="2800" b="0" i="1" smtClean="0">
-                                  <a:solidFill>
-                                    <a:schemeClr val="bg1"/>
-                                  </a:solidFill>
-                                  <a:latin typeface="Cambria Math" panose="02040503050406030204" pitchFamily="18" charset="0"/>
-                                  <a:ea typeface="Cambria Math" panose="02040503050406030204" pitchFamily="18" charset="0"/>
-                                </a:rPr>
-                                <m:t>−6</m:t>
-                              </m:r>
-                            </m:sup>
-                          </m:sSup>
-                          <m:r>
-                            <a:rPr lang="en-US" sz="2800" b="0" i="1" smtClean="0">
-                              <a:solidFill>
-                                <a:schemeClr val="bg1"/>
-                              </a:solidFill>
-                              <a:latin typeface="Cambria Math" panose="02040503050406030204" pitchFamily="18" charset="0"/>
-                              <a:ea typeface="Cambria Math" panose="02040503050406030204" pitchFamily="18" charset="0"/>
-                            </a:rPr>
-                            <m:t>)</m:t>
-                          </m:r>
-                        </m:den>
-                      </m:f>
-                    </m:oMath>
-                  </m:oMathPara>
-                </a14:m>
-                <a:endParaRPr lang="en-US" sz="2800" b="0" dirty="0">
-                  <a:solidFill>
-                    <a:schemeClr val="bg1"/>
-                  </a:solidFill>
-                </a:endParaRPr>
-              </a:p>
-            </p:txBody>
-          </p:sp>
-        </mc:Choice>
-        <mc:Fallback xmlns="">
-          <p:sp>
-            <p:nvSpPr>
-              <p:cNvPr id="9" name="TextBox 8">
-                <a:extLst>
-                  <a:ext uri="{FF2B5EF4-FFF2-40B4-BE49-F238E27FC236}">
-                    <a16:creationId xmlns:a16="http://schemas.microsoft.com/office/drawing/2014/main" id="{1D603E76-420C-4ACE-A159-20A194E8EEE7}"/>
-                  </a:ext>
-                </a:extLst>
-              </p:cNvPr>
-              <p:cNvSpPr txBox="1">
-                <a:spLocks noRot="1" noChangeAspect="1" noMove="1" noResize="1" noEditPoints="1" noAdjustHandles="1" noChangeArrowheads="1" noChangeShapeType="1" noTextEdit="1"/>
-              </p:cNvSpPr>
-              <p:nvPr/>
-            </p:nvSpPr>
-            <p:spPr>
-              <a:xfrm>
-                <a:off x="4114797" y="1909831"/>
-                <a:ext cx="4136108" cy="763222"/>
-              </a:xfrm>
-              <a:prstGeom prst="rect">
-                <a:avLst/>
-              </a:prstGeom>
-              <a:blipFill>
-                <a:blip r:embed="rId4"/>
-                <a:stretch>
-                  <a:fillRect/>
-                </a:stretch>
-              </a:blipFill>
-            </p:spPr>
-            <p:txBody>
-              <a:bodyPr/>
-              <a:lstStyle/>
-              <a:p>
-                <a:r>
-                  <a:rPr lang="en-US">
-                    <a:noFill/>
-                  </a:rPr>
-                  <a:t> </a:t>
-                </a:r>
-              </a:p>
-            </p:txBody>
-          </p:sp>
-        </mc:Fallback>
-      </mc:AlternateContent>
-      <mc:AlternateContent xmlns:mc="http://schemas.openxmlformats.org/markup-compatibility/2006" xmlns:a14="http://schemas.microsoft.com/office/drawing/2010/main">
-        <mc:Choice Requires="a14">
-          <p:sp>
-            <p:nvSpPr>
-              <p:cNvPr id="10" name="TextBox 9">
-                <a:extLst>
-                  <a:ext uri="{FF2B5EF4-FFF2-40B4-BE49-F238E27FC236}">
-                    <a16:creationId xmlns:a16="http://schemas.microsoft.com/office/drawing/2014/main" id="{81F0CAD5-9AAB-467A-9C58-5BA6C54FF6E3}"/>
-                  </a:ext>
-                </a:extLst>
-              </p:cNvPr>
-              <p:cNvSpPr txBox="1"/>
-              <p:nvPr/>
-            </p:nvSpPr>
-            <p:spPr>
-              <a:xfrm>
-                <a:off x="4345521" y="2802072"/>
-                <a:ext cx="3675813" cy="523220"/>
-              </a:xfrm>
-              <a:prstGeom prst="rect">
-                <a:avLst/>
-              </a:prstGeom>
-              <a:noFill/>
-            </p:spPr>
-            <p:txBody>
-              <a:bodyPr wrap="square" rtlCol="0">
-                <a:spAutoFit/>
-              </a:bodyPr>
-              <a:lstStyle/>
-              <a:p>
-                <a:pPr algn="ctr"/>
-                <a14:m>
-                  <m:oMath xmlns:m="http://schemas.openxmlformats.org/officeDocument/2006/math">
-                    <m:r>
-                      <a:rPr lang="en-US" sz="2800" b="0" i="1" smtClean="0">
-                        <a:solidFill>
-                          <a:schemeClr val="bg1"/>
-                        </a:solidFill>
-                        <a:latin typeface="Cambria Math" panose="02040503050406030204" pitchFamily="18" charset="0"/>
-                      </a:rPr>
-                      <m:t>𝑓</m:t>
-                    </m:r>
-                    <m:r>
-                      <a:rPr lang="en-US" sz="2800" b="0" i="1" baseline="-25000" smtClean="0">
-                        <a:solidFill>
-                          <a:schemeClr val="bg1"/>
-                        </a:solidFill>
-                        <a:latin typeface="Cambria Math" panose="02040503050406030204" pitchFamily="18" charset="0"/>
-                      </a:rPr>
-                      <m:t>𝑐</m:t>
-                    </m:r>
-                    <m:r>
-                      <a:rPr lang="en-US" sz="2800" b="0" i="1" smtClean="0">
-                        <a:solidFill>
-                          <a:schemeClr val="bg1"/>
-                        </a:solidFill>
-                        <a:latin typeface="Cambria Math" panose="02040503050406030204" pitchFamily="18" charset="0"/>
-                      </a:rPr>
-                      <m:t>=</m:t>
-                    </m:r>
-                    <m:f>
-                      <m:fPr>
-                        <m:type m:val="skw"/>
-                        <m:ctrlPr>
-                          <a:rPr lang="en-US" sz="2800" b="0" i="1" smtClean="0">
-                            <a:solidFill>
-                              <a:schemeClr val="bg1"/>
-                            </a:solidFill>
-                            <a:latin typeface="Cambria Math" panose="02040503050406030204" pitchFamily="18" charset="0"/>
-                          </a:rPr>
-                        </m:ctrlPr>
-                      </m:fPr>
-                      <m:num>
-                        <m:r>
-                          <a:rPr lang="en-US" sz="2800" b="0" i="1" smtClean="0">
-                            <a:solidFill>
-                              <a:schemeClr val="bg1"/>
-                            </a:solidFill>
-                            <a:latin typeface="Cambria Math" panose="02040503050406030204" pitchFamily="18" charset="0"/>
-                          </a:rPr>
-                          <m:t>1</m:t>
-                        </m:r>
-                      </m:num>
-                      <m:den>
-                        <m:r>
-                          <a:rPr lang="en-US" sz="2800" b="0" i="1" smtClean="0">
-                            <a:solidFill>
-                              <a:schemeClr val="bg1"/>
-                            </a:solidFill>
-                            <a:latin typeface="Cambria Math" panose="02040503050406030204" pitchFamily="18" charset="0"/>
-                          </a:rPr>
-                          <m:t>0.001</m:t>
-                        </m:r>
-                      </m:den>
-                    </m:f>
-                  </m:oMath>
-                </a14:m>
-                <a:r>
-                  <a:rPr lang="en-US" sz="2800" dirty="0">
-                    <a:solidFill>
-                      <a:schemeClr val="bg1"/>
-                    </a:solidFill>
-                  </a:rPr>
-                  <a:t> </a:t>
-                </a:r>
-                <a14:m>
-                  <m:oMath xmlns:m="http://schemas.openxmlformats.org/officeDocument/2006/math">
-                    <m:r>
-                      <a:rPr lang="en-US" sz="2800" i="1" smtClean="0">
-                        <a:solidFill>
-                          <a:schemeClr val="bg1"/>
-                        </a:solidFill>
-                        <a:latin typeface="Cambria Math" panose="02040503050406030204" pitchFamily="18" charset="0"/>
-                      </a:rPr>
-                      <m:t>=</m:t>
-                    </m:r>
-                  </m:oMath>
-                </a14:m>
-                <a:r>
-                  <a:rPr lang="en-US" sz="2800" b="0" dirty="0">
-                    <a:solidFill>
-                      <a:schemeClr val="bg1"/>
-                    </a:solidFill>
-                  </a:rPr>
-                  <a:t> </a:t>
-                </a:r>
-                <a14:m>
-                  <m:oMath xmlns:m="http://schemas.openxmlformats.org/officeDocument/2006/math">
-                    <m:r>
-                      <a:rPr lang="en-US" sz="2800" i="1">
-                        <a:solidFill>
-                          <a:schemeClr val="bg1"/>
-                        </a:solidFill>
-                        <a:latin typeface="Cambria Math" panose="02040503050406030204" pitchFamily="18" charset="0"/>
-                      </a:rPr>
-                      <m:t>1000</m:t>
-                    </m:r>
-                  </m:oMath>
-                </a14:m>
-                <a:r>
-                  <a:rPr lang="en-US" sz="2800" b="0" dirty="0">
-                    <a:solidFill>
-                      <a:schemeClr val="bg1"/>
-                    </a:solidFill>
-                  </a:rPr>
-                  <a:t> Hz</a:t>
-                </a:r>
-              </a:p>
-            </p:txBody>
-          </p:sp>
-        </mc:Choice>
-        <mc:Fallback xmlns="">
-          <p:sp>
-            <p:nvSpPr>
-              <p:cNvPr id="10" name="TextBox 9">
-                <a:extLst>
-                  <a:ext uri="{FF2B5EF4-FFF2-40B4-BE49-F238E27FC236}">
-                    <a16:creationId xmlns:a16="http://schemas.microsoft.com/office/drawing/2014/main" id="{81F0CAD5-9AAB-467A-9C58-5BA6C54FF6E3}"/>
-                  </a:ext>
-                </a:extLst>
-              </p:cNvPr>
-              <p:cNvSpPr txBox="1">
-                <a:spLocks noRot="1" noChangeAspect="1" noMove="1" noResize="1" noEditPoints="1" noAdjustHandles="1" noChangeArrowheads="1" noChangeShapeType="1" noTextEdit="1"/>
-              </p:cNvSpPr>
-              <p:nvPr/>
-            </p:nvSpPr>
-            <p:spPr>
-              <a:xfrm>
-                <a:off x="4345521" y="2802072"/>
-                <a:ext cx="3675813" cy="523220"/>
-              </a:xfrm>
-              <a:prstGeom prst="rect">
-                <a:avLst/>
-              </a:prstGeom>
-              <a:blipFill>
-                <a:blip r:embed="rId5"/>
-                <a:stretch>
-                  <a:fillRect t="-11765" r="-1658" b="-34118"/>
-                </a:stretch>
-              </a:blipFill>
-            </p:spPr>
-            <p:txBody>
-              <a:bodyPr/>
-              <a:lstStyle/>
-              <a:p>
-                <a:r>
-                  <a:rPr lang="en-US">
-                    <a:noFill/>
-                  </a:rPr>
-                  <a:t> </a:t>
-                </a:r>
-              </a:p>
-            </p:txBody>
-          </p:sp>
-        </mc:Fallback>
-      </mc:AlternateContent>
       <p:sp>
         <p:nvSpPr>
           <p:cNvPr id="11" name="TextBox 10">
@@ -10848,7 +10505,7 @@
           <p:nvPr/>
         </p:nvPicPr>
         <p:blipFill rotWithShape="1">
-          <a:blip r:embed="rId6">
+          <a:blip r:embed="rId4">
             <a:extLst>
               <a:ext uri="{28A0092B-C50C-407E-A947-70E740481C1C}">
                 <a14:useLocalDpi xmlns:a14="http://schemas.microsoft.com/office/drawing/2010/main" val="0"/>
@@ -15945,7 +15602,7 @@
         <p:spPr>
           <a:xfrm>
             <a:off x="677636" y="1108970"/>
-            <a:ext cx="7796893" cy="6001643"/>
+            <a:ext cx="7796893" cy="5632311"/>
           </a:xfrm>
           <a:prstGeom prst="rect">
             <a:avLst/>
@@ -16126,13 +15783,6 @@
               </a:rPr>
               <a:t>Digital-Analog signal conversion</a:t>
             </a:r>
-          </a:p>
-          <a:p>
-            <a:endParaRPr lang="en-US" sz="2400" dirty="0">
-              <a:solidFill>
-                <a:schemeClr val="bg1"/>
-              </a:solidFill>
-            </a:endParaRPr>
           </a:p>
         </p:txBody>
       </p:sp>

</xml_diff>